<commit_message>
Updates to architecture document to match the most recent changes
</commit_message>
<xml_diff>
--- a/docs/archive/Prototype Architecture v1.pptx
+++ b/docs/archive/Prototype Architecture v1.pptx
@@ -288,7 +288,7 @@
           <a:p>
             <a:fld id="{8D337652-CCE0-4003-A824-1BACC2905D10}" type="datetimeFigureOut">
               <a:rPr lang="en-US" smtClean="0"/>
-              <a:t>6/22/2015</a:t>
+              <a:t>6/25/2015</a:t>
             </a:fld>
             <a:endParaRPr lang="en-US"/>
           </a:p>
@@ -458,7 +458,7 @@
           <a:p>
             <a:fld id="{8D337652-CCE0-4003-A824-1BACC2905D10}" type="datetimeFigureOut">
               <a:rPr lang="en-US" smtClean="0"/>
-              <a:t>6/22/2015</a:t>
+              <a:t>6/25/2015</a:t>
             </a:fld>
             <a:endParaRPr lang="en-US"/>
           </a:p>
@@ -638,7 +638,7 @@
           <a:p>
             <a:fld id="{8D337652-CCE0-4003-A824-1BACC2905D10}" type="datetimeFigureOut">
               <a:rPr lang="en-US" smtClean="0"/>
-              <a:t>6/22/2015</a:t>
+              <a:t>6/25/2015</a:t>
             </a:fld>
             <a:endParaRPr lang="en-US"/>
           </a:p>
@@ -808,7 +808,7 @@
           <a:p>
             <a:fld id="{8D337652-CCE0-4003-A824-1BACC2905D10}" type="datetimeFigureOut">
               <a:rPr lang="en-US" smtClean="0"/>
-              <a:t>6/22/2015</a:t>
+              <a:t>6/25/2015</a:t>
             </a:fld>
             <a:endParaRPr lang="en-US"/>
           </a:p>
@@ -1054,7 +1054,7 @@
           <a:p>
             <a:fld id="{8D337652-CCE0-4003-A824-1BACC2905D10}" type="datetimeFigureOut">
               <a:rPr lang="en-US" smtClean="0"/>
-              <a:t>6/22/2015</a:t>
+              <a:t>6/25/2015</a:t>
             </a:fld>
             <a:endParaRPr lang="en-US"/>
           </a:p>
@@ -1342,7 +1342,7 @@
           <a:p>
             <a:fld id="{8D337652-CCE0-4003-A824-1BACC2905D10}" type="datetimeFigureOut">
               <a:rPr lang="en-US" smtClean="0"/>
-              <a:t>6/22/2015</a:t>
+              <a:t>6/25/2015</a:t>
             </a:fld>
             <a:endParaRPr lang="en-US"/>
           </a:p>
@@ -1764,7 +1764,7 @@
           <a:p>
             <a:fld id="{8D337652-CCE0-4003-A824-1BACC2905D10}" type="datetimeFigureOut">
               <a:rPr lang="en-US" smtClean="0"/>
-              <a:t>6/22/2015</a:t>
+              <a:t>6/25/2015</a:t>
             </a:fld>
             <a:endParaRPr lang="en-US"/>
           </a:p>
@@ -1882,7 +1882,7 @@
           <a:p>
             <a:fld id="{8D337652-CCE0-4003-A824-1BACC2905D10}" type="datetimeFigureOut">
               <a:rPr lang="en-US" smtClean="0"/>
-              <a:t>6/22/2015</a:t>
+              <a:t>6/25/2015</a:t>
             </a:fld>
             <a:endParaRPr lang="en-US"/>
           </a:p>
@@ -1977,7 +1977,7 @@
           <a:p>
             <a:fld id="{8D337652-CCE0-4003-A824-1BACC2905D10}" type="datetimeFigureOut">
               <a:rPr lang="en-US" smtClean="0"/>
-              <a:t>6/22/2015</a:t>
+              <a:t>6/25/2015</a:t>
             </a:fld>
             <a:endParaRPr lang="en-US"/>
           </a:p>
@@ -2254,7 +2254,7 @@
           <a:p>
             <a:fld id="{8D337652-CCE0-4003-A824-1BACC2905D10}" type="datetimeFigureOut">
               <a:rPr lang="en-US" smtClean="0"/>
-              <a:t>6/22/2015</a:t>
+              <a:t>6/25/2015</a:t>
             </a:fld>
             <a:endParaRPr lang="en-US"/>
           </a:p>
@@ -2507,7 +2507,7 @@
           <a:p>
             <a:fld id="{8D337652-CCE0-4003-A824-1BACC2905D10}" type="datetimeFigureOut">
               <a:rPr lang="en-US" smtClean="0"/>
-              <a:t>6/22/2015</a:t>
+              <a:t>6/25/2015</a:t>
             </a:fld>
             <a:endParaRPr lang="en-US"/>
           </a:p>
@@ -2720,7 +2720,7 @@
           <a:p>
             <a:fld id="{8D337652-CCE0-4003-A824-1BACC2905D10}" type="datetimeFigureOut">
               <a:rPr lang="en-US" smtClean="0"/>
-              <a:t>6/22/2015</a:t>
+              <a:t>6/25/2015</a:t>
             </a:fld>
             <a:endParaRPr lang="en-US"/>
           </a:p>
@@ -3103,7 +3103,7 @@
         </p:nvSpPr>
         <p:spPr>
           <a:xfrm>
-            <a:off x="838200" y="2096163"/>
+            <a:off x="609600" y="2035638"/>
             <a:ext cx="1676400" cy="533400"/>
           </a:xfrm>
           <a:prstGeom prst="rect">
@@ -3152,7 +3152,7 @@
         </p:nvSpPr>
         <p:spPr>
           <a:xfrm>
-            <a:off x="838200" y="3124200"/>
+            <a:off x="609600" y="2810389"/>
             <a:ext cx="1676400" cy="533400"/>
           </a:xfrm>
           <a:prstGeom prst="rect">
@@ -3201,7 +3201,7 @@
         </p:nvSpPr>
         <p:spPr>
           <a:xfrm>
-            <a:off x="838200" y="4210547"/>
+            <a:off x="609600" y="3915466"/>
             <a:ext cx="1676400" cy="533400"/>
           </a:xfrm>
           <a:prstGeom prst="rect">
@@ -3250,7 +3250,7 @@
         </p:nvSpPr>
         <p:spPr>
           <a:xfrm>
-            <a:off x="3200400" y="4115795"/>
+            <a:off x="2933700" y="3818734"/>
             <a:ext cx="1066800" cy="722905"/>
           </a:xfrm>
           <a:prstGeom prst="roundRect">
@@ -3288,7 +3288,7 @@
             <a:pPr algn="ctr"/>
             <a:r>
               <a:rPr lang="en-US" sz="800" dirty="0" smtClean="0"/>
-              <a:t>(normalize data fields)</a:t>
+              <a:t>(normalize distribution area)</a:t>
             </a:r>
             <a:endParaRPr lang="en-US" sz="800" dirty="0"/>
           </a:p>
@@ -3304,9 +3304,9 @@
           <p:nvPr/>
         </p:nvCxnSpPr>
         <p:spPr>
-          <a:xfrm>
-            <a:off x="2514600" y="4477247"/>
-            <a:ext cx="685800" cy="1"/>
+          <a:xfrm flipV="1">
+            <a:off x="2286000" y="4180187"/>
+            <a:ext cx="647700" cy="1979"/>
           </a:xfrm>
           <a:prstGeom prst="straightConnector1">
             <a:avLst/>
@@ -3339,7 +3339,7 @@
         </p:nvSpPr>
         <p:spPr>
           <a:xfrm>
-            <a:off x="3352800" y="5334000"/>
+            <a:off x="3918238" y="5193782"/>
             <a:ext cx="762000" cy="533400"/>
           </a:xfrm>
           <a:prstGeom prst="can">
@@ -3383,7 +3383,7 @@
         </p:nvSpPr>
         <p:spPr>
           <a:xfrm>
-            <a:off x="5181600" y="4229100"/>
+            <a:off x="4727864" y="3899346"/>
             <a:ext cx="838200" cy="533400"/>
           </a:xfrm>
           <a:prstGeom prst="can">
@@ -3419,16 +3419,16 @@
       </p:sp>
       <p:sp>
         <p:nvSpPr>
-          <p:cNvPr id="18" name="Oval 17"/>
+          <p:cNvPr id="18" name="Rounded Rectangle 17"/>
           <p:cNvSpPr/>
           <p:nvPr/>
         </p:nvSpPr>
         <p:spPr>
           <a:xfrm>
-            <a:off x="5181600" y="3009900"/>
-            <a:ext cx="838200" cy="762000"/>
+            <a:off x="4613564" y="2073019"/>
+            <a:ext cx="1066800" cy="1380951"/>
           </a:xfrm>
-          <a:prstGeom prst="ellipse">
+          <a:prstGeom prst="roundRect">
             <a:avLst/>
           </a:prstGeom>
         </p:spPr>
@@ -3453,96 +3453,45 @@
             <a:pPr algn="ctr"/>
             <a:r>
               <a:rPr lang="en-US" sz="1100" dirty="0" smtClean="0"/>
-              <a:t>Web Server</a:t>
-            </a:r>
+              <a:t>Web </a:t>
+            </a:r>
+            <a:r>
+              <a:rPr lang="en-US" sz="1100" dirty="0" smtClean="0"/>
+              <a:t>Server</a:t>
+            </a:r>
+          </a:p>
+          <a:p>
+            <a:pPr algn="ctr"/>
             <a:endParaRPr lang="en-US" sz="1100" dirty="0"/>
           </a:p>
-        </p:txBody>
-      </p:sp>
-      <p:sp>
-        <p:nvSpPr>
-          <p:cNvPr id="19" name="Rectangle 18"/>
-          <p:cNvSpPr/>
-          <p:nvPr/>
-        </p:nvSpPr>
-        <p:spPr>
-          <a:xfrm>
-            <a:off x="6781800" y="1752600"/>
-            <a:ext cx="1524000" cy="838200"/>
-          </a:xfrm>
-          <a:prstGeom prst="rect">
-            <a:avLst/>
-          </a:prstGeom>
-          <a:ln w="9525">
-            <a:solidFill>
-              <a:schemeClr val="tx1"/>
-            </a:solidFill>
-          </a:ln>
-        </p:spPr>
-        <p:style>
-          <a:lnRef idx="2">
-            <a:schemeClr val="accent4"/>
-          </a:lnRef>
-          <a:fillRef idx="1">
-            <a:schemeClr val="lt1"/>
-          </a:fillRef>
-          <a:effectRef idx="0">
-            <a:schemeClr val="accent4"/>
-          </a:effectRef>
-          <a:fontRef idx="minor">
-            <a:schemeClr val="dk1"/>
-          </a:fontRef>
-        </p:style>
-        <p:txBody>
-          <a:bodyPr rtlCol="0" anchor="ctr"/>
-          <a:lstStyle/>
           <a:p>
             <a:pPr algn="ctr"/>
-            <a:endParaRPr lang="en-US"/>
-          </a:p>
-        </p:txBody>
-      </p:sp>
-      <p:pic>
-        <p:nvPicPr>
-          <p:cNvPr id="1026" name="Picture 2" descr="C:\Users\cannaliatot\AppData\Local\Microsoft\Windows\Temporary Internet Files\Content.IE5\W71HI3VR\Computer-cartoon[1].jpg"/>
-          <p:cNvPicPr>
-            <a:picLocks noChangeAspect="1" noChangeArrowheads="1"/>
-          </p:cNvPicPr>
-          <p:nvPr/>
-        </p:nvPicPr>
-        <p:blipFill>
-          <a:blip r:embed="rId2" cstate="print">
-            <a:extLst>
-              <a:ext uri="{28A0092B-C50C-407E-A947-70E740481C1C}">
-                <a14:useLocalDpi xmlns:a14="http://schemas.microsoft.com/office/drawing/2010/main" val="0"/>
-              </a:ext>
-            </a:extLst>
-          </a:blip>
-          <a:srcRect/>
-          <a:stretch>
-            <a:fillRect/>
-          </a:stretch>
-        </p:blipFill>
-        <p:spPr bwMode="auto">
-          <a:xfrm>
-            <a:off x="7162800" y="2983642"/>
-            <a:ext cx="800100" cy="940658"/>
-          </a:xfrm>
-          <a:prstGeom prst="rect">
-            <a:avLst/>
-          </a:prstGeom>
-          <a:noFill/>
-          <a:extLst>
-            <a:ext uri="{909E8E84-426E-40DD-AFC4-6F175D3DCCD1}">
-              <a14:hiddenFill xmlns:a14="http://schemas.microsoft.com/office/drawing/2010/main">
-                <a:solidFill>
-                  <a:srgbClr val="FFFFFF"/>
-                </a:solidFill>
-              </a14:hiddenFill>
-            </a:ext>
-          </a:extLst>
-        </p:spPr>
-      </p:pic>
+            <a:r>
+              <a:rPr lang="en-US" sz="1100" dirty="0" smtClean="0"/>
+              <a:t>(FDA Recall</a:t>
+            </a:r>
+          </a:p>
+          <a:p>
+            <a:pPr algn="ctr"/>
+            <a:r>
+              <a:rPr lang="en-US" sz="1100" dirty="0" smtClean="0"/>
+              <a:t>GUI</a:t>
+            </a:r>
+            <a:r>
+              <a:rPr lang="en-US" sz="1100" dirty="0" smtClean="0"/>
+              <a:t>)</a:t>
+            </a:r>
+          </a:p>
+          <a:p>
+            <a:pPr algn="ctr"/>
+            <a:r>
+              <a:rPr lang="en-US" sz="1100" dirty="0" smtClean="0"/>
+              <a:t>(Mongo API)</a:t>
+            </a:r>
+            <a:endParaRPr lang="en-US" sz="1100" dirty="0"/>
+          </a:p>
+        </p:txBody>
+      </p:sp>
       <p:sp>
         <p:nvSpPr>
           <p:cNvPr id="23" name="Rectangle 22"/>
@@ -3551,8 +3500,8 @@
         </p:nvSpPr>
         <p:spPr>
           <a:xfrm>
-            <a:off x="4838700" y="2792398"/>
-            <a:ext cx="1524000" cy="2427302"/>
+            <a:off x="4391891" y="1744372"/>
+            <a:ext cx="1524000" cy="2951291"/>
           </a:xfrm>
           <a:prstGeom prst="rect">
             <a:avLst/>
@@ -3595,7 +3544,7 @@
         </p:nvSpPr>
         <p:spPr>
           <a:xfrm>
-            <a:off x="4953000" y="4914900"/>
+            <a:off x="4488873" y="1784432"/>
             <a:ext cx="1295400" cy="246221"/>
           </a:xfrm>
           <a:prstGeom prst="rect">
@@ -3618,42 +3567,6 @@
           </a:p>
         </p:txBody>
       </p:sp>
-      <p:cxnSp>
-        <p:nvCxnSpPr>
-          <p:cNvPr id="26" name="Elbow Connector 25"/>
-          <p:cNvCxnSpPr>
-            <a:stCxn id="16" idx="4"/>
-            <a:endCxn id="17" idx="2"/>
-          </p:cNvCxnSpPr>
-          <p:nvPr/>
-        </p:nvCxnSpPr>
-        <p:spPr>
-          <a:xfrm flipV="1">
-            <a:off x="4114800" y="4495800"/>
-            <a:ext cx="1066800" cy="1104900"/>
-          </a:xfrm>
-          <a:prstGeom prst="bentConnector3">
-            <a:avLst/>
-          </a:prstGeom>
-          <a:ln>
-            <a:tailEnd type="arrow"/>
-          </a:ln>
-        </p:spPr>
-        <p:style>
-          <a:lnRef idx="1">
-            <a:schemeClr val="accent1"/>
-          </a:lnRef>
-          <a:fillRef idx="0">
-            <a:schemeClr val="accent1"/>
-          </a:fillRef>
-          <a:effectRef idx="0">
-            <a:schemeClr val="accent1"/>
-          </a:effectRef>
-          <a:fontRef idx="minor">
-            <a:schemeClr val="tx1"/>
-          </a:fontRef>
-        </p:style>
-      </p:cxnSp>
       <p:sp>
         <p:nvSpPr>
           <p:cNvPr id="27" name="TextBox 26"/>
@@ -3662,7 +3575,7 @@
         </p:nvSpPr>
         <p:spPr>
           <a:xfrm>
-            <a:off x="4381500" y="5334000"/>
+            <a:off x="5223902" y="4925831"/>
             <a:ext cx="457200" cy="400110"/>
           </a:xfrm>
           <a:prstGeom prst="rect">
@@ -3678,13 +3591,7 @@
           <a:p>
             <a:r>
               <a:rPr lang="en-US" sz="1000" dirty="0" smtClean="0"/>
-              <a:t>copy</a:t>
-            </a:r>
-          </a:p>
-          <a:p>
-            <a:r>
-              <a:rPr lang="en-US" sz="1000" dirty="0" smtClean="0"/>
-              <a:t>data</a:t>
+              <a:t>Data Copy</a:t>
             </a:r>
             <a:endParaRPr lang="en-US" sz="1000" dirty="0"/>
           </a:p>
@@ -3695,16 +3602,16 @@
           <p:cNvPr id="29" name="Straight Arrow Connector 28"/>
           <p:cNvCxnSpPr>
             <a:stCxn id="7" idx="2"/>
-            <a:endCxn id="16" idx="0"/>
+            <a:endCxn id="16" idx="2"/>
           </p:cNvCxnSpPr>
           <p:nvPr/>
         </p:nvCxnSpPr>
         <p:spPr>
-          <a:xfrm>
-            <a:off x="3733800" y="4838700"/>
-            <a:ext cx="0" cy="628650"/>
+          <a:xfrm rot="16200000" flipH="1">
+            <a:off x="3233248" y="4775491"/>
+            <a:ext cx="918843" cy="451138"/>
           </a:xfrm>
-          <a:prstGeom prst="straightConnector1">
+          <a:prstGeom prst="bentConnector2">
             <a:avLst/>
           </a:prstGeom>
           <a:ln>
@@ -3730,15 +3637,15 @@
         <p:nvCxnSpPr>
           <p:cNvPr id="1025" name="Straight Arrow Connector 1024"/>
           <p:cNvCxnSpPr>
-            <a:stCxn id="18" idx="4"/>
+            <a:stCxn id="18" idx="2"/>
             <a:endCxn id="17" idx="1"/>
           </p:cNvCxnSpPr>
           <p:nvPr/>
         </p:nvCxnSpPr>
         <p:spPr>
           <a:xfrm>
-            <a:off x="5600700" y="3771900"/>
-            <a:ext cx="0" cy="457200"/>
+            <a:off x="5146964" y="3453970"/>
+            <a:ext cx="0" cy="445376"/>
           </a:xfrm>
           <a:prstGeom prst="straightConnector1">
             <a:avLst/>
@@ -3768,14 +3675,592 @@
           <p:cNvPr id="1030" name="Straight Arrow Connector 1029"/>
           <p:cNvCxnSpPr>
             <a:stCxn id="5" idx="3"/>
-            <a:endCxn id="18" idx="2"/>
+          </p:cNvCxnSpPr>
+          <p:nvPr/>
+        </p:nvCxnSpPr>
+        <p:spPr>
+          <a:xfrm flipV="1">
+            <a:off x="2286000" y="3074620"/>
+            <a:ext cx="2327564" cy="2469"/>
+          </a:xfrm>
+          <a:prstGeom prst="straightConnector1">
+            <a:avLst/>
+          </a:prstGeom>
+          <a:ln>
+            <a:headEnd type="arrow" w="med" len="med"/>
+            <a:tailEnd type="arrow" w="med" len="med"/>
+          </a:ln>
+        </p:spPr>
+        <p:style>
+          <a:lnRef idx="1">
+            <a:schemeClr val="accent1"/>
+          </a:lnRef>
+          <a:fillRef idx="0">
+            <a:schemeClr val="accent1"/>
+          </a:fillRef>
+          <a:effectRef idx="0">
+            <a:schemeClr val="accent1"/>
+          </a:effectRef>
+          <a:fontRef idx="minor">
+            <a:schemeClr val="tx1"/>
+          </a:fontRef>
+        </p:style>
+      </p:cxnSp>
+      <p:sp>
+        <p:nvSpPr>
+          <p:cNvPr id="41" name="TextBox 40"/>
+          <p:cNvSpPr txBox="1"/>
+          <p:nvPr/>
+        </p:nvSpPr>
+        <p:spPr>
+          <a:xfrm>
+            <a:off x="2933700" y="2032655"/>
+            <a:ext cx="723900" cy="246221"/>
+          </a:xfrm>
+          <a:prstGeom prst="rect">
+            <a:avLst/>
+          </a:prstGeom>
+          <a:noFill/>
+        </p:spPr>
+        <p:txBody>
+          <a:bodyPr wrap="square" rtlCol="0">
+            <a:spAutoFit/>
+          </a:bodyPr>
+          <a:lstStyle/>
+          <a:p>
+            <a:r>
+              <a:rPr lang="en-US" sz="1000" dirty="0" smtClean="0"/>
+              <a:t>REST API</a:t>
+            </a:r>
+            <a:endParaRPr lang="en-US" sz="1000" dirty="0"/>
+          </a:p>
+        </p:txBody>
+      </p:sp>
+      <p:sp>
+        <p:nvSpPr>
+          <p:cNvPr id="42" name="TextBox 41"/>
+          <p:cNvSpPr txBox="1"/>
+          <p:nvPr/>
+        </p:nvSpPr>
+        <p:spPr>
+          <a:xfrm>
+            <a:off x="2933700" y="2765309"/>
+            <a:ext cx="723900" cy="246221"/>
+          </a:xfrm>
+          <a:prstGeom prst="rect">
+            <a:avLst/>
+          </a:prstGeom>
+          <a:noFill/>
+        </p:spPr>
+        <p:txBody>
+          <a:bodyPr wrap="square" rtlCol="0">
+            <a:spAutoFit/>
+          </a:bodyPr>
+          <a:lstStyle/>
+          <a:p>
+            <a:r>
+              <a:rPr lang="en-US" sz="1000" dirty="0" smtClean="0"/>
+              <a:t>REST API</a:t>
+            </a:r>
+            <a:endParaRPr lang="en-US" sz="1000" dirty="0"/>
+          </a:p>
+        </p:txBody>
+      </p:sp>
+      <p:cxnSp>
+        <p:nvCxnSpPr>
+          <p:cNvPr id="1034" name="Straight Arrow Connector 1033"/>
+          <p:cNvCxnSpPr>
+            <a:stCxn id="18" idx="3"/>
+            <a:endCxn id="19" idx="1"/>
+          </p:cNvCxnSpPr>
+          <p:nvPr/>
+        </p:nvCxnSpPr>
+        <p:spPr>
+          <a:xfrm flipV="1">
+            <a:off x="5680364" y="2762155"/>
+            <a:ext cx="1327310" cy="1340"/>
+          </a:xfrm>
+          <a:prstGeom prst="straightConnector1">
+            <a:avLst/>
+          </a:prstGeom>
+          <a:ln>
+            <a:headEnd type="arrow" w="med" len="med"/>
+            <a:tailEnd type="arrow" w="med" len="med"/>
+          </a:ln>
+        </p:spPr>
+        <p:style>
+          <a:lnRef idx="1">
+            <a:schemeClr val="accent1"/>
+          </a:lnRef>
+          <a:fillRef idx="0">
+            <a:schemeClr val="accent1"/>
+          </a:fillRef>
+          <a:effectRef idx="0">
+            <a:schemeClr val="accent1"/>
+          </a:effectRef>
+          <a:fontRef idx="minor">
+            <a:schemeClr val="tx1"/>
+          </a:fontRef>
+        </p:style>
+      </p:cxnSp>
+      <p:grpSp>
+        <p:nvGrpSpPr>
+          <p:cNvPr id="53" name="Group 52"/>
+          <p:cNvGrpSpPr/>
+          <p:nvPr/>
+        </p:nvGrpSpPr>
+        <p:grpSpPr>
+          <a:xfrm>
+            <a:off x="7007674" y="2343055"/>
+            <a:ext cx="1524000" cy="2171700"/>
+            <a:chOff x="6781800" y="1752600"/>
+            <a:chExt cx="1524000" cy="2171700"/>
+          </a:xfrm>
+        </p:grpSpPr>
+        <p:grpSp>
+          <p:nvGrpSpPr>
+            <p:cNvPr id="52" name="Group 51"/>
+            <p:cNvGrpSpPr/>
+            <p:nvPr/>
+          </p:nvGrpSpPr>
+          <p:grpSpPr>
+            <a:xfrm>
+              <a:off x="6781800" y="1752600"/>
+              <a:ext cx="1524000" cy="2171700"/>
+              <a:chOff x="6781800" y="1752600"/>
+              <a:chExt cx="1524000" cy="2171700"/>
+            </a:xfrm>
+          </p:grpSpPr>
+          <p:sp>
+            <p:nvSpPr>
+              <p:cNvPr id="19" name="Rectangle 18"/>
+              <p:cNvSpPr/>
+              <p:nvPr/>
+            </p:nvSpPr>
+            <p:spPr>
+              <a:xfrm>
+                <a:off x="6781800" y="1752600"/>
+                <a:ext cx="1524000" cy="838200"/>
+              </a:xfrm>
+              <a:prstGeom prst="rect">
+                <a:avLst/>
+              </a:prstGeom>
+              <a:ln w="9525">
+                <a:solidFill>
+                  <a:schemeClr val="tx1"/>
+                </a:solidFill>
+              </a:ln>
+            </p:spPr>
+            <p:style>
+              <a:lnRef idx="2">
+                <a:schemeClr val="accent4"/>
+              </a:lnRef>
+              <a:fillRef idx="1">
+                <a:schemeClr val="lt1"/>
+              </a:fillRef>
+              <a:effectRef idx="0">
+                <a:schemeClr val="accent4"/>
+              </a:effectRef>
+              <a:fontRef idx="minor">
+                <a:schemeClr val="dk1"/>
+              </a:fontRef>
+            </p:style>
+            <p:txBody>
+              <a:bodyPr rtlCol="0" anchor="ctr"/>
+              <a:lstStyle/>
+              <a:p>
+                <a:pPr algn="ctr"/>
+                <a:endParaRPr lang="en-US"/>
+              </a:p>
+            </p:txBody>
+          </p:sp>
+          <p:pic>
+            <p:nvPicPr>
+              <p:cNvPr id="1026" name="Picture 2" descr="C:\Users\cannaliatot\AppData\Local\Microsoft\Windows\Temporary Internet Files\Content.IE5\W71HI3VR\Computer-cartoon[1].jpg"/>
+              <p:cNvPicPr>
+                <a:picLocks noChangeAspect="1" noChangeArrowheads="1"/>
+              </p:cNvPicPr>
+              <p:nvPr/>
+            </p:nvPicPr>
+            <p:blipFill>
+              <a:blip r:embed="rId2" cstate="print">
+                <a:extLst>
+                  <a:ext uri="{28A0092B-C50C-407E-A947-70E740481C1C}">
+                    <a14:useLocalDpi xmlns:a14="http://schemas.microsoft.com/office/drawing/2010/main" val="0"/>
+                  </a:ext>
+                </a:extLst>
+              </a:blip>
+              <a:srcRect/>
+              <a:stretch>
+                <a:fillRect/>
+              </a:stretch>
+            </p:blipFill>
+            <p:spPr bwMode="auto">
+              <a:xfrm>
+                <a:off x="7162800" y="2983642"/>
+                <a:ext cx="800100" cy="940658"/>
+              </a:xfrm>
+              <a:prstGeom prst="rect">
+                <a:avLst/>
+              </a:prstGeom>
+              <a:noFill/>
+              <a:extLst>
+                <a:ext uri="{909E8E84-426E-40DD-AFC4-6F175D3DCCD1}">
+                  <a14:hiddenFill xmlns:a14="http://schemas.microsoft.com/office/drawing/2010/main">
+                    <a:solidFill>
+                      <a:srgbClr val="FFFFFF"/>
+                    </a:solidFill>
+                  </a14:hiddenFill>
+                </a:ext>
+              </a:extLst>
+            </p:spPr>
+          </p:pic>
+          <p:cxnSp>
+            <p:nvCxnSpPr>
+              <p:cNvPr id="48" name="Straight Connector 47"/>
+              <p:cNvCxnSpPr/>
+              <p:nvPr/>
+            </p:nvCxnSpPr>
+            <p:spPr>
+              <a:xfrm flipH="1">
+                <a:off x="7809506" y="2629563"/>
+                <a:ext cx="496294" cy="371723"/>
+              </a:xfrm>
+              <a:prstGeom prst="line">
+                <a:avLst/>
+              </a:prstGeom>
+              <a:ln>
+                <a:solidFill>
+                  <a:schemeClr val="tx1"/>
+                </a:solidFill>
+                <a:prstDash val="dash"/>
+              </a:ln>
+            </p:spPr>
+            <p:style>
+              <a:lnRef idx="1">
+                <a:schemeClr val="accent1"/>
+              </a:lnRef>
+              <a:fillRef idx="0">
+                <a:schemeClr val="accent1"/>
+              </a:fillRef>
+              <a:effectRef idx="0">
+                <a:schemeClr val="accent1"/>
+              </a:effectRef>
+              <a:fontRef idx="minor">
+                <a:schemeClr val="tx1"/>
+              </a:fontRef>
+            </p:style>
+          </p:cxnSp>
+          <p:cxnSp>
+            <p:nvCxnSpPr>
+              <p:cNvPr id="57" name="Straight Connector 56"/>
+              <p:cNvCxnSpPr/>
+              <p:nvPr/>
+            </p:nvCxnSpPr>
+            <p:spPr>
+              <a:xfrm>
+                <a:off x="6781800" y="2629563"/>
+                <a:ext cx="533400" cy="380337"/>
+              </a:xfrm>
+              <a:prstGeom prst="line">
+                <a:avLst/>
+              </a:prstGeom>
+              <a:ln>
+                <a:solidFill>
+                  <a:schemeClr val="tx1"/>
+                </a:solidFill>
+                <a:prstDash val="dash"/>
+              </a:ln>
+            </p:spPr>
+            <p:style>
+              <a:lnRef idx="1">
+                <a:schemeClr val="accent1"/>
+              </a:lnRef>
+              <a:fillRef idx="0">
+                <a:schemeClr val="accent1"/>
+              </a:fillRef>
+              <a:effectRef idx="0">
+                <a:schemeClr val="accent1"/>
+              </a:effectRef>
+              <a:fontRef idx="minor">
+                <a:schemeClr val="tx1"/>
+              </a:fontRef>
+            </p:style>
+          </p:cxnSp>
+        </p:grpSp>
+        <p:sp>
+          <p:nvSpPr>
+            <p:cNvPr id="1048" name="Rectangle 1047"/>
+            <p:cNvSpPr/>
+            <p:nvPr/>
+          </p:nvSpPr>
+          <p:spPr>
+            <a:xfrm>
+              <a:off x="7239000" y="1868359"/>
+              <a:ext cx="647700" cy="114300"/>
+            </a:xfrm>
+            <a:prstGeom prst="rect">
+              <a:avLst/>
+            </a:prstGeom>
+          </p:spPr>
+          <p:style>
+            <a:lnRef idx="2">
+              <a:schemeClr val="accent3"/>
+            </a:lnRef>
+            <a:fillRef idx="1">
+              <a:schemeClr val="lt1"/>
+            </a:fillRef>
+            <a:effectRef idx="0">
+              <a:schemeClr val="accent3"/>
+            </a:effectRef>
+            <a:fontRef idx="minor">
+              <a:schemeClr val="dk1"/>
+            </a:fontRef>
+          </p:style>
+          <p:txBody>
+            <a:bodyPr rtlCol="0" anchor="ctr"/>
+            <a:lstStyle/>
+            <a:p>
+              <a:pPr algn="ctr"/>
+              <a:endParaRPr lang="en-US"/>
+            </a:p>
+          </p:txBody>
+        </p:sp>
+        <p:sp>
+          <p:nvSpPr>
+            <p:cNvPr id="1049" name="TextBox 1048"/>
+            <p:cNvSpPr txBox="1"/>
+            <p:nvPr/>
+          </p:nvSpPr>
+          <p:spPr>
+            <a:xfrm>
+              <a:off x="6858000" y="1805315"/>
+              <a:ext cx="457200" cy="215444"/>
+            </a:xfrm>
+            <a:prstGeom prst="rect">
+              <a:avLst/>
+            </a:prstGeom>
+            <a:noFill/>
+          </p:spPr>
+          <p:txBody>
+            <a:bodyPr wrap="square" rtlCol="0">
+              <a:spAutoFit/>
+            </a:bodyPr>
+            <a:lstStyle/>
+            <a:p>
+              <a:r>
+                <a:rPr lang="en-US" sz="800" dirty="0" smtClean="0"/>
+                <a:t>Drug:</a:t>
+              </a:r>
+              <a:endParaRPr lang="en-US" sz="800" dirty="0"/>
+            </a:p>
+          </p:txBody>
+        </p:sp>
+        <p:sp>
+          <p:nvSpPr>
+            <p:cNvPr id="1051" name="Rounded Rectangle 1050"/>
+            <p:cNvSpPr/>
+            <p:nvPr/>
+          </p:nvSpPr>
+          <p:spPr>
+            <a:xfrm>
+              <a:off x="7163794" y="2349082"/>
+              <a:ext cx="761006" cy="165518"/>
+            </a:xfrm>
+            <a:prstGeom prst="roundRect">
+              <a:avLst/>
+            </a:prstGeom>
+          </p:spPr>
+          <p:style>
+            <a:lnRef idx="1">
+              <a:schemeClr val="accent3"/>
+            </a:lnRef>
+            <a:fillRef idx="2">
+              <a:schemeClr val="accent3"/>
+            </a:fillRef>
+            <a:effectRef idx="1">
+              <a:schemeClr val="accent3"/>
+            </a:effectRef>
+            <a:fontRef idx="minor">
+              <a:schemeClr val="dk1"/>
+            </a:fontRef>
+          </p:style>
+          <p:txBody>
+            <a:bodyPr rtlCol="0" anchor="ctr"/>
+            <a:lstStyle/>
+            <a:p>
+              <a:pPr algn="ctr"/>
+              <a:r>
+                <a:rPr lang="en-US" sz="800" dirty="0" smtClean="0"/>
+                <a:t>Map</a:t>
+              </a:r>
+              <a:endParaRPr lang="en-US" sz="800" dirty="0"/>
+            </a:p>
+          </p:txBody>
+        </p:sp>
+        <p:sp>
+          <p:nvSpPr>
+            <p:cNvPr id="65" name="Rounded Rectangle 64"/>
+            <p:cNvSpPr/>
+            <p:nvPr/>
+          </p:nvSpPr>
+          <p:spPr>
+            <a:xfrm>
+              <a:off x="6858000" y="2096959"/>
+              <a:ext cx="609600" cy="183922"/>
+            </a:xfrm>
+            <a:prstGeom prst="roundRect">
+              <a:avLst/>
+            </a:prstGeom>
+          </p:spPr>
+          <p:style>
+            <a:lnRef idx="1">
+              <a:schemeClr val="accent3"/>
+            </a:lnRef>
+            <a:fillRef idx="2">
+              <a:schemeClr val="accent3"/>
+            </a:fillRef>
+            <a:effectRef idx="1">
+              <a:schemeClr val="accent3"/>
+            </a:effectRef>
+            <a:fontRef idx="minor">
+              <a:schemeClr val="dk1"/>
+            </a:fontRef>
+          </p:style>
+          <p:txBody>
+            <a:bodyPr rtlCol="0" anchor="ctr"/>
+            <a:lstStyle/>
+            <a:p>
+              <a:pPr algn="ctr"/>
+              <a:r>
+                <a:rPr lang="en-US" sz="700" dirty="0" smtClean="0"/>
+                <a:t>Label Info</a:t>
+              </a:r>
+              <a:endParaRPr lang="en-US" sz="700" dirty="0"/>
+            </a:p>
+          </p:txBody>
+        </p:sp>
+        <p:sp>
+          <p:nvSpPr>
+            <p:cNvPr id="67" name="Rounded Rectangle 66"/>
+            <p:cNvSpPr/>
+            <p:nvPr/>
+          </p:nvSpPr>
+          <p:spPr>
+            <a:xfrm>
+              <a:off x="7543800" y="2096959"/>
+              <a:ext cx="685800" cy="183922"/>
+            </a:xfrm>
+            <a:prstGeom prst="roundRect">
+              <a:avLst/>
+            </a:prstGeom>
+          </p:spPr>
+          <p:style>
+            <a:lnRef idx="1">
+              <a:schemeClr val="accent3"/>
+            </a:lnRef>
+            <a:fillRef idx="2">
+              <a:schemeClr val="accent3"/>
+            </a:fillRef>
+            <a:effectRef idx="1">
+              <a:schemeClr val="accent3"/>
+            </a:effectRef>
+            <a:fontRef idx="minor">
+              <a:schemeClr val="dk1"/>
+            </a:fontRef>
+          </p:style>
+          <p:txBody>
+            <a:bodyPr rtlCol="0" anchor="ctr"/>
+            <a:lstStyle/>
+            <a:p>
+              <a:pPr algn="ctr"/>
+              <a:r>
+                <a:rPr lang="en-US" sz="700" dirty="0" smtClean="0"/>
+                <a:t>Adverse Info</a:t>
+              </a:r>
+              <a:endParaRPr lang="en-US" sz="700" dirty="0"/>
+            </a:p>
+          </p:txBody>
+        </p:sp>
+      </p:grpSp>
+      <p:sp>
+        <p:nvSpPr>
+          <p:cNvPr id="68" name="TextBox 67"/>
+          <p:cNvSpPr txBox="1"/>
+          <p:nvPr/>
+        </p:nvSpPr>
+        <p:spPr>
+          <a:xfrm>
+            <a:off x="6130636" y="2887674"/>
+            <a:ext cx="686794" cy="400110"/>
+          </a:xfrm>
+          <a:prstGeom prst="rect">
+            <a:avLst/>
+          </a:prstGeom>
+          <a:noFill/>
+        </p:spPr>
+        <p:txBody>
+          <a:bodyPr wrap="square" rtlCol="0">
+            <a:spAutoFit/>
+          </a:bodyPr>
+          <a:lstStyle/>
+          <a:p>
+            <a:r>
+              <a:rPr lang="en-US" sz="1000" dirty="0" smtClean="0"/>
+              <a:t>HTTP &amp;</a:t>
+            </a:r>
+          </a:p>
+          <a:p>
+            <a:r>
+              <a:rPr lang="en-US" sz="1000" dirty="0" smtClean="0"/>
+              <a:t>REST API</a:t>
+            </a:r>
+            <a:endParaRPr lang="en-US" sz="1000" dirty="0"/>
+          </a:p>
+        </p:txBody>
+      </p:sp>
+      <p:sp>
+        <p:nvSpPr>
+          <p:cNvPr id="1052" name="TextBox 1051"/>
+          <p:cNvSpPr txBox="1"/>
+          <p:nvPr/>
+        </p:nvSpPr>
+        <p:spPr>
+          <a:xfrm>
+            <a:off x="2819400" y="926068"/>
+            <a:ext cx="3543300" cy="369332"/>
+          </a:xfrm>
+          <a:prstGeom prst="rect">
+            <a:avLst/>
+          </a:prstGeom>
+          <a:noFill/>
+        </p:spPr>
+        <p:txBody>
+          <a:bodyPr wrap="square" rtlCol="0">
+            <a:spAutoFit/>
+          </a:bodyPr>
+          <a:lstStyle/>
+          <a:p>
+            <a:r>
+              <a:rPr lang="en-US" dirty="0" smtClean="0"/>
+              <a:t>FDA Prototype System Architecture</a:t>
+            </a:r>
+            <a:endParaRPr lang="en-US" dirty="0"/>
+          </a:p>
+        </p:txBody>
+      </p:sp>
+      <p:cxnSp>
+        <p:nvCxnSpPr>
+          <p:cNvPr id="51" name="Straight Arrow Connector 50"/>
+          <p:cNvCxnSpPr>
+            <a:stCxn id="4" idx="3"/>
           </p:cNvCxnSpPr>
           <p:nvPr/>
         </p:nvCxnSpPr>
         <p:spPr>
           <a:xfrm>
-            <a:off x="2514600" y="3390900"/>
-            <a:ext cx="2667000" cy="0"/>
+            <a:off x="2286000" y="2302338"/>
+            <a:ext cx="2327564" cy="0"/>
           </a:xfrm>
           <a:prstGeom prst="straightConnector1">
             <a:avLst/>
@@ -3802,24 +4287,23 @@
       </p:cxnSp>
       <p:cxnSp>
         <p:nvCxnSpPr>
-          <p:cNvPr id="1032" name="Elbow Connector 1031"/>
+          <p:cNvPr id="76" name="Straight Arrow Connector 28"/>
           <p:cNvCxnSpPr>
-            <a:stCxn id="4" idx="3"/>
-            <a:endCxn id="18" idx="0"/>
+            <a:stCxn id="16" idx="4"/>
+            <a:endCxn id="17" idx="3"/>
           </p:cNvCxnSpPr>
           <p:nvPr/>
         </p:nvCxnSpPr>
         <p:spPr>
-          <a:xfrm>
-            <a:off x="2514600" y="2362863"/>
-            <a:ext cx="3086100" cy="647037"/>
+          <a:xfrm flipV="1">
+            <a:off x="4680238" y="4432746"/>
+            <a:ext cx="466726" cy="1027736"/>
           </a:xfrm>
           <a:prstGeom prst="bentConnector2">
             <a:avLst/>
           </a:prstGeom>
           <a:ln>
-            <a:headEnd type="arrow" w="med" len="med"/>
-            <a:tailEnd type="arrow" w="med" len="med"/>
+            <a:tailEnd type="arrow"/>
           </a:ln>
         </p:spPr>
         <p:style>
@@ -3839,13 +4323,43 @@
       </p:cxnSp>
       <p:sp>
         <p:nvSpPr>
-          <p:cNvPr id="41" name="TextBox 40"/>
+          <p:cNvPr id="82" name="TextBox 81"/>
           <p:cNvSpPr txBox="1"/>
           <p:nvPr/>
         </p:nvSpPr>
         <p:spPr>
           <a:xfrm>
-            <a:off x="3657600" y="2123331"/>
+            <a:off x="2838450" y="4939686"/>
+            <a:ext cx="552450" cy="400110"/>
+          </a:xfrm>
+          <a:prstGeom prst="rect">
+            <a:avLst/>
+          </a:prstGeom>
+          <a:noFill/>
+        </p:spPr>
+        <p:txBody>
+          <a:bodyPr wrap="square" rtlCol="0">
+            <a:spAutoFit/>
+          </a:bodyPr>
+          <a:lstStyle/>
+          <a:p>
+            <a:r>
+              <a:rPr lang="en-US" sz="1000" dirty="0" smtClean="0"/>
+              <a:t>Mongo Driver</a:t>
+            </a:r>
+            <a:endParaRPr lang="en-US" sz="1000" dirty="0"/>
+          </a:p>
+        </p:txBody>
+      </p:sp>
+      <p:sp>
+        <p:nvSpPr>
+          <p:cNvPr id="83" name="TextBox 82"/>
+          <p:cNvSpPr txBox="1"/>
+          <p:nvPr/>
+        </p:nvSpPr>
+        <p:spPr>
+          <a:xfrm>
+            <a:off x="4479220" y="3553547"/>
             <a:ext cx="723900" cy="246221"/>
           </a:xfrm>
           <a:prstGeom prst="rect">
@@ -3869,13 +4383,13 @@
       </p:sp>
       <p:sp>
         <p:nvSpPr>
-          <p:cNvPr id="42" name="TextBox 41"/>
+          <p:cNvPr id="84" name="TextBox 83"/>
           <p:cNvSpPr txBox="1"/>
           <p:nvPr/>
         </p:nvSpPr>
         <p:spPr>
           <a:xfrm>
-            <a:off x="3657600" y="3162300"/>
+            <a:off x="2286000" y="3649517"/>
             <a:ext cx="723900" cy="246221"/>
           </a:xfrm>
           <a:prstGeom prst="rect">
@@ -3894,404 +4408,6 @@
               <a:t>REST API</a:t>
             </a:r>
             <a:endParaRPr lang="en-US" sz="1000" dirty="0"/>
-          </a:p>
-        </p:txBody>
-      </p:sp>
-      <p:sp>
-        <p:nvSpPr>
-          <p:cNvPr id="43" name="TextBox 42"/>
-          <p:cNvSpPr txBox="1"/>
-          <p:nvPr/>
-        </p:nvSpPr>
-        <p:spPr>
-          <a:xfrm>
-            <a:off x="2628900" y="4267200"/>
-            <a:ext cx="457200" cy="400110"/>
-          </a:xfrm>
-          <a:prstGeom prst="rect">
-            <a:avLst/>
-          </a:prstGeom>
-          <a:noFill/>
-        </p:spPr>
-        <p:txBody>
-          <a:bodyPr wrap="square" rtlCol="0">
-            <a:spAutoFit/>
-          </a:bodyPr>
-          <a:lstStyle/>
-          <a:p>
-            <a:r>
-              <a:rPr lang="en-US" sz="1000" dirty="0" smtClean="0"/>
-              <a:t>REST API</a:t>
-            </a:r>
-            <a:endParaRPr lang="en-US" sz="1000" dirty="0"/>
-          </a:p>
-        </p:txBody>
-      </p:sp>
-      <p:cxnSp>
-        <p:nvCxnSpPr>
-          <p:cNvPr id="1034" name="Straight Arrow Connector 1033"/>
-          <p:cNvCxnSpPr>
-            <a:stCxn id="18" idx="6"/>
-          </p:cNvCxnSpPr>
-          <p:nvPr/>
-        </p:nvCxnSpPr>
-        <p:spPr>
-          <a:xfrm>
-            <a:off x="6019800" y="3390900"/>
-            <a:ext cx="1295400" cy="0"/>
-          </a:xfrm>
-          <a:prstGeom prst="straightConnector1">
-            <a:avLst/>
-          </a:prstGeom>
-          <a:ln>
-            <a:headEnd type="arrow" w="med" len="med"/>
-            <a:tailEnd type="arrow" w="med" len="med"/>
-          </a:ln>
-        </p:spPr>
-        <p:style>
-          <a:lnRef idx="1">
-            <a:schemeClr val="accent1"/>
-          </a:lnRef>
-          <a:fillRef idx="0">
-            <a:schemeClr val="accent1"/>
-          </a:fillRef>
-          <a:effectRef idx="0">
-            <a:schemeClr val="accent1"/>
-          </a:effectRef>
-          <a:fontRef idx="minor">
-            <a:schemeClr val="tx1"/>
-          </a:fontRef>
-        </p:style>
-      </p:cxnSp>
-      <p:cxnSp>
-        <p:nvCxnSpPr>
-          <p:cNvPr id="48" name="Straight Connector 47"/>
-          <p:cNvCxnSpPr/>
-          <p:nvPr/>
-        </p:nvCxnSpPr>
-        <p:spPr>
-          <a:xfrm flipH="1">
-            <a:off x="7809506" y="2629563"/>
-            <a:ext cx="496294" cy="371723"/>
-          </a:xfrm>
-          <a:prstGeom prst="line">
-            <a:avLst/>
-          </a:prstGeom>
-          <a:ln>
-            <a:solidFill>
-              <a:schemeClr val="tx1"/>
-            </a:solidFill>
-            <a:prstDash val="dash"/>
-          </a:ln>
-        </p:spPr>
-        <p:style>
-          <a:lnRef idx="1">
-            <a:schemeClr val="accent1"/>
-          </a:lnRef>
-          <a:fillRef idx="0">
-            <a:schemeClr val="accent1"/>
-          </a:fillRef>
-          <a:effectRef idx="0">
-            <a:schemeClr val="accent1"/>
-          </a:effectRef>
-          <a:fontRef idx="minor">
-            <a:schemeClr val="tx1"/>
-          </a:fontRef>
-        </p:style>
-      </p:cxnSp>
-      <p:cxnSp>
-        <p:nvCxnSpPr>
-          <p:cNvPr id="57" name="Straight Connector 56"/>
-          <p:cNvCxnSpPr/>
-          <p:nvPr/>
-        </p:nvCxnSpPr>
-        <p:spPr>
-          <a:xfrm>
-            <a:off x="6781800" y="2629563"/>
-            <a:ext cx="533400" cy="380337"/>
-          </a:xfrm>
-          <a:prstGeom prst="line">
-            <a:avLst/>
-          </a:prstGeom>
-          <a:ln>
-            <a:solidFill>
-              <a:schemeClr val="tx1"/>
-            </a:solidFill>
-            <a:prstDash val="dash"/>
-          </a:ln>
-        </p:spPr>
-        <p:style>
-          <a:lnRef idx="1">
-            <a:schemeClr val="accent1"/>
-          </a:lnRef>
-          <a:fillRef idx="0">
-            <a:schemeClr val="accent1"/>
-          </a:fillRef>
-          <a:effectRef idx="0">
-            <a:schemeClr val="accent1"/>
-          </a:effectRef>
-          <a:fontRef idx="minor">
-            <a:schemeClr val="tx1"/>
-          </a:fontRef>
-        </p:style>
-      </p:cxnSp>
-      <p:sp>
-        <p:nvSpPr>
-          <p:cNvPr id="1048" name="Rectangle 1047"/>
-          <p:cNvSpPr/>
-          <p:nvPr/>
-        </p:nvSpPr>
-        <p:spPr>
-          <a:xfrm>
-            <a:off x="7239000" y="1868359"/>
-            <a:ext cx="647700" cy="114300"/>
-          </a:xfrm>
-          <a:prstGeom prst="rect">
-            <a:avLst/>
-          </a:prstGeom>
-        </p:spPr>
-        <p:style>
-          <a:lnRef idx="2">
-            <a:schemeClr val="accent3"/>
-          </a:lnRef>
-          <a:fillRef idx="1">
-            <a:schemeClr val="lt1"/>
-          </a:fillRef>
-          <a:effectRef idx="0">
-            <a:schemeClr val="accent3"/>
-          </a:effectRef>
-          <a:fontRef idx="minor">
-            <a:schemeClr val="dk1"/>
-          </a:fontRef>
-        </p:style>
-        <p:txBody>
-          <a:bodyPr rtlCol="0" anchor="ctr"/>
-          <a:lstStyle/>
-          <a:p>
-            <a:pPr algn="ctr"/>
-            <a:endParaRPr lang="en-US"/>
-          </a:p>
-        </p:txBody>
-      </p:sp>
-      <p:sp>
-        <p:nvSpPr>
-          <p:cNvPr id="1049" name="TextBox 1048"/>
-          <p:cNvSpPr txBox="1"/>
-          <p:nvPr/>
-        </p:nvSpPr>
-        <p:spPr>
-          <a:xfrm>
-            <a:off x="6858000" y="1805315"/>
-            <a:ext cx="457200" cy="215444"/>
-          </a:xfrm>
-          <a:prstGeom prst="rect">
-            <a:avLst/>
-          </a:prstGeom>
-          <a:noFill/>
-        </p:spPr>
-        <p:txBody>
-          <a:bodyPr wrap="square" rtlCol="0">
-            <a:spAutoFit/>
-          </a:bodyPr>
-          <a:lstStyle/>
-          <a:p>
-            <a:r>
-              <a:rPr lang="en-US" sz="800" dirty="0" smtClean="0"/>
-              <a:t>Drug:</a:t>
-            </a:r>
-            <a:endParaRPr lang="en-US" sz="800" dirty="0"/>
-          </a:p>
-        </p:txBody>
-      </p:sp>
-      <p:sp>
-        <p:nvSpPr>
-          <p:cNvPr id="1051" name="Rounded Rectangle 1050"/>
-          <p:cNvSpPr/>
-          <p:nvPr/>
-        </p:nvSpPr>
-        <p:spPr>
-          <a:xfrm>
-            <a:off x="7163794" y="2349082"/>
-            <a:ext cx="761006" cy="165518"/>
-          </a:xfrm>
-          <a:prstGeom prst="roundRect">
-            <a:avLst/>
-          </a:prstGeom>
-        </p:spPr>
-        <p:style>
-          <a:lnRef idx="1">
-            <a:schemeClr val="accent3"/>
-          </a:lnRef>
-          <a:fillRef idx="2">
-            <a:schemeClr val="accent3"/>
-          </a:fillRef>
-          <a:effectRef idx="1">
-            <a:schemeClr val="accent3"/>
-          </a:effectRef>
-          <a:fontRef idx="minor">
-            <a:schemeClr val="dk1"/>
-          </a:fontRef>
-        </p:style>
-        <p:txBody>
-          <a:bodyPr rtlCol="0" anchor="ctr"/>
-          <a:lstStyle/>
-          <a:p>
-            <a:pPr algn="ctr"/>
-            <a:r>
-              <a:rPr lang="en-US" sz="800" dirty="0" smtClean="0"/>
-              <a:t>Map</a:t>
-            </a:r>
-            <a:endParaRPr lang="en-US" sz="800" dirty="0"/>
-          </a:p>
-        </p:txBody>
-      </p:sp>
-      <p:sp>
-        <p:nvSpPr>
-          <p:cNvPr id="65" name="Rounded Rectangle 64"/>
-          <p:cNvSpPr/>
-          <p:nvPr/>
-        </p:nvSpPr>
-        <p:spPr>
-          <a:xfrm>
-            <a:off x="6858000" y="2096959"/>
-            <a:ext cx="609600" cy="183922"/>
-          </a:xfrm>
-          <a:prstGeom prst="roundRect">
-            <a:avLst/>
-          </a:prstGeom>
-        </p:spPr>
-        <p:style>
-          <a:lnRef idx="1">
-            <a:schemeClr val="accent3"/>
-          </a:lnRef>
-          <a:fillRef idx="2">
-            <a:schemeClr val="accent3"/>
-          </a:fillRef>
-          <a:effectRef idx="1">
-            <a:schemeClr val="accent3"/>
-          </a:effectRef>
-          <a:fontRef idx="minor">
-            <a:schemeClr val="dk1"/>
-          </a:fontRef>
-        </p:style>
-        <p:txBody>
-          <a:bodyPr rtlCol="0" anchor="ctr"/>
-          <a:lstStyle/>
-          <a:p>
-            <a:pPr algn="ctr"/>
-            <a:r>
-              <a:rPr lang="en-US" sz="700" dirty="0" smtClean="0"/>
-              <a:t>Label Info</a:t>
-            </a:r>
-            <a:endParaRPr lang="en-US" sz="700" dirty="0"/>
-          </a:p>
-        </p:txBody>
-      </p:sp>
-      <p:sp>
-        <p:nvSpPr>
-          <p:cNvPr id="67" name="Rounded Rectangle 66"/>
-          <p:cNvSpPr/>
-          <p:nvPr/>
-        </p:nvSpPr>
-        <p:spPr>
-          <a:xfrm>
-            <a:off x="7543800" y="2096959"/>
-            <a:ext cx="685800" cy="183922"/>
-          </a:xfrm>
-          <a:prstGeom prst="roundRect">
-            <a:avLst/>
-          </a:prstGeom>
-        </p:spPr>
-        <p:style>
-          <a:lnRef idx="1">
-            <a:schemeClr val="accent3"/>
-          </a:lnRef>
-          <a:fillRef idx="2">
-            <a:schemeClr val="accent3"/>
-          </a:fillRef>
-          <a:effectRef idx="1">
-            <a:schemeClr val="accent3"/>
-          </a:effectRef>
-          <a:fontRef idx="minor">
-            <a:schemeClr val="dk1"/>
-          </a:fontRef>
-        </p:style>
-        <p:txBody>
-          <a:bodyPr rtlCol="0" anchor="ctr"/>
-          <a:lstStyle/>
-          <a:p>
-            <a:pPr algn="ctr"/>
-            <a:r>
-              <a:rPr lang="en-US" sz="700" dirty="0" smtClean="0"/>
-              <a:t>Adverse Info</a:t>
-            </a:r>
-            <a:endParaRPr lang="en-US" sz="700" dirty="0"/>
-          </a:p>
-        </p:txBody>
-      </p:sp>
-      <p:sp>
-        <p:nvSpPr>
-          <p:cNvPr id="68" name="TextBox 67"/>
-          <p:cNvSpPr txBox="1"/>
-          <p:nvPr/>
-        </p:nvSpPr>
-        <p:spPr>
-          <a:xfrm>
-            <a:off x="6400800" y="3200400"/>
-            <a:ext cx="686794" cy="400110"/>
-          </a:xfrm>
-          <a:prstGeom prst="rect">
-            <a:avLst/>
-          </a:prstGeom>
-          <a:noFill/>
-        </p:spPr>
-        <p:txBody>
-          <a:bodyPr wrap="square" rtlCol="0">
-            <a:spAutoFit/>
-          </a:bodyPr>
-          <a:lstStyle/>
-          <a:p>
-            <a:r>
-              <a:rPr lang="en-US" sz="1000" dirty="0" smtClean="0"/>
-              <a:t>HTTP &amp;</a:t>
-            </a:r>
-          </a:p>
-          <a:p>
-            <a:r>
-              <a:rPr lang="en-US" sz="1000" dirty="0" smtClean="0"/>
-              <a:t>REST API</a:t>
-            </a:r>
-            <a:endParaRPr lang="en-US" sz="1000" dirty="0"/>
-          </a:p>
-        </p:txBody>
-      </p:sp>
-      <p:sp>
-        <p:nvSpPr>
-          <p:cNvPr id="1052" name="TextBox 1051"/>
-          <p:cNvSpPr txBox="1"/>
-          <p:nvPr/>
-        </p:nvSpPr>
-        <p:spPr>
-          <a:xfrm>
-            <a:off x="2819400" y="926068"/>
-            <a:ext cx="3543300" cy="369332"/>
-          </a:xfrm>
-          <a:prstGeom prst="rect">
-            <a:avLst/>
-          </a:prstGeom>
-          <a:noFill/>
-        </p:spPr>
-        <p:txBody>
-          <a:bodyPr wrap="square" rtlCol="0">
-            <a:spAutoFit/>
-          </a:bodyPr>
-          <a:lstStyle/>
-          <a:p>
-            <a:r>
-              <a:rPr lang="en-US" dirty="0" smtClean="0"/>
-              <a:t>FDA Prototype System Architecture</a:t>
-            </a:r>
-            <a:endParaRPr lang="en-US" dirty="0"/>
           </a:p>
         </p:txBody>
       </p:sp>
@@ -4305,6 +4421,13 @@
   <p:clrMapOvr>
     <a:masterClrMapping/>
   </p:clrMapOvr>
+  <p:timing>
+    <p:tnLst>
+      <p:par>
+        <p:cTn id="1" dur="indefinite" restart="never" nodeType="tmRoot"/>
+      </p:par>
+    </p:tnLst>
+  </p:timing>
 </p:sld>
 </file>
 

</xml_diff>